<commit_message>
Ajout de que faire lors du clic sur présenter (vérif' noir)
</commit_message>
<xml_diff>
--- a/Présentations/Test.pptx
+++ b/Présentations/Test.pptx
@@ -3080,15 +3080,10 @@
             <a:spLocks noGrp="1"/>
           </p:cNvSpPr>
           <p:nvPr>
-            <p:ph type="ctrTitle"/>
-          </p:nvPr>
-        </p:nvSpPr>
-        <p:spPr>
-          <a:xfrm>
-            <a:off x="685800" y="2130425"/>
-            <a:ext cx="7772400" cy="1470025"/>
-          </a:xfrm>
-        </p:spPr>
+            <p:ph type="title"/>
+          </p:nvPr>
+        </p:nvSpPr>
+        <p:spPr/>
         <p:txBody>
           <a:bodyPr/>
           <a:lstStyle/>
@@ -3096,125 +3091,6 @@
             <a:r>
               <a:rPr lang="en-US"/>
               <a:t>Test</a:t>
-            </a:r>
-            <a:endParaRPr lang="en-US" smtClean="0"/>
-          </a:p>
-        </p:txBody>
-      </p:sp>
-      <p:sp xmlns:r="http://schemas.openxmlformats.org/officeDocument/2006/relationships">
-        <p:nvSpPr>
-          <p:cNvPr id="3" name="Subtitle 2"/>
-          <p:cNvSpPr>
-            <a:spLocks noGrp="1"/>
-          </p:cNvSpPr>
-          <p:nvPr>
-            <p:ph idx="1" type="subTitle"/>
-          </p:nvPr>
-        </p:nvSpPr>
-        <p:spPr>
-          <a:xfrm>
-            <a:off x="1371600" y="3886200"/>
-            <a:ext cx="6400800" cy="1752600"/>
-          </a:xfrm>
-        </p:spPr>
-        <p:txBody>
-          <a:bodyPr/>
-          <a:lstStyle>
-            <a:lvl1pPr algn="ctr" indent="0" marL="0">
-              <a:buNone/>
-              <a:defRPr>
-                <a:solidFill>
-                  <a:schemeClr val="tx1">
-                    <a:tint val="75000"/>
-                  </a:schemeClr>
-                </a:solidFill>
-              </a:defRPr>
-            </a:lvl1pPr>
-            <a:lvl2pPr algn="ctr" indent="0" marL="457200">
-              <a:buNone/>
-              <a:defRPr>
-                <a:solidFill>
-                  <a:schemeClr val="tx1">
-                    <a:tint val="75000"/>
-                  </a:schemeClr>
-                </a:solidFill>
-              </a:defRPr>
-            </a:lvl2pPr>
-            <a:lvl3pPr algn="ctr" indent="0" marL="914400">
-              <a:buNone/>
-              <a:defRPr>
-                <a:solidFill>
-                  <a:schemeClr val="tx1">
-                    <a:tint val="75000"/>
-                  </a:schemeClr>
-                </a:solidFill>
-              </a:defRPr>
-            </a:lvl3pPr>
-            <a:lvl4pPr algn="ctr" indent="0" marL="1371600">
-              <a:buNone/>
-              <a:defRPr>
-                <a:solidFill>
-                  <a:schemeClr val="tx1">
-                    <a:tint val="75000"/>
-                  </a:schemeClr>
-                </a:solidFill>
-              </a:defRPr>
-            </a:lvl4pPr>
-            <a:lvl5pPr algn="ctr" indent="0" marL="1828800">
-              <a:buNone/>
-              <a:defRPr>
-                <a:solidFill>
-                  <a:schemeClr val="tx1">
-                    <a:tint val="75000"/>
-                  </a:schemeClr>
-                </a:solidFill>
-              </a:defRPr>
-            </a:lvl5pPr>
-            <a:lvl6pPr algn="ctr" indent="0" marL="2286000">
-              <a:buNone/>
-              <a:defRPr>
-                <a:solidFill>
-                  <a:schemeClr val="tx1">
-                    <a:tint val="75000"/>
-                  </a:schemeClr>
-                </a:solidFill>
-              </a:defRPr>
-            </a:lvl6pPr>
-            <a:lvl7pPr algn="ctr" indent="0" marL="2743200">
-              <a:buNone/>
-              <a:defRPr>
-                <a:solidFill>
-                  <a:schemeClr val="tx1">
-                    <a:tint val="75000"/>
-                  </a:schemeClr>
-                </a:solidFill>
-              </a:defRPr>
-            </a:lvl7pPr>
-            <a:lvl8pPr algn="ctr" indent="0" marL="3200400">
-              <a:buNone/>
-              <a:defRPr>
-                <a:solidFill>
-                  <a:schemeClr val="tx1">
-                    <a:tint val="75000"/>
-                  </a:schemeClr>
-                </a:solidFill>
-              </a:defRPr>
-            </a:lvl8pPr>
-            <a:lvl9pPr algn="ctr" indent="0" marL="3657600">
-              <a:buNone/>
-              <a:defRPr>
-                <a:solidFill>
-                  <a:schemeClr val="tx1">
-                    <a:tint val="75000"/>
-                  </a:schemeClr>
-                </a:solidFill>
-              </a:defRPr>
-            </a:lvl9pPr>
-          </a:lstStyle>
-          <a:p>
-            <a:r>
-              <a:rPr lang="en-US"/>
-              <a:t/>
             </a:r>
             <a:endParaRPr lang="en-US" smtClean="0"/>
           </a:p>

</xml_diff>